<commit_message>
Chap04: last pictures and corrections on previous ones.
</commit_message>
<xml_diff>
--- a/04 - Cr MagOpt/Picture/Fig01-PLE.pptx
+++ b/04 - Cr MagOpt/Picture/Fig01-PLE.pptx
@@ -7,14 +7,14 @@
   <p:sldIdLst>
     <p:sldId id="256" r:id="rId2"/>
   </p:sldIdLst>
-  <p:sldSz cx="7056438" cy="7200900"/>
+  <p:sldSz cx="9901238" cy="7200900"/>
   <p:notesSz cx="6858000" cy="9144000"/>
   <p:defaultTextStyle>
     <a:defPPr>
       <a:defRPr lang="fr-FR"/>
     </a:defPPr>
-    <a:lvl1pPr marL="0" algn="l" defTabSz="914400" rtl="0" eaLnBrk="1" latinLnBrk="0" hangingPunct="1">
-      <a:defRPr sz="1800" kern="1200">
+    <a:lvl1pPr marL="0" algn="l" defTabSz="1131570" rtl="0" eaLnBrk="1" latinLnBrk="0" hangingPunct="1">
+      <a:defRPr sz="2200" kern="1200">
         <a:solidFill>
           <a:schemeClr val="tx1"/>
         </a:solidFill>
@@ -23,8 +23,8 @@
         <a:cs typeface="+mn-cs"/>
       </a:defRPr>
     </a:lvl1pPr>
-    <a:lvl2pPr marL="457200" algn="l" defTabSz="914400" rtl="0" eaLnBrk="1" latinLnBrk="0" hangingPunct="1">
-      <a:defRPr sz="1800" kern="1200">
+    <a:lvl2pPr marL="565785" algn="l" defTabSz="1131570" rtl="0" eaLnBrk="1" latinLnBrk="0" hangingPunct="1">
+      <a:defRPr sz="2200" kern="1200">
         <a:solidFill>
           <a:schemeClr val="tx1"/>
         </a:solidFill>
@@ -33,8 +33,8 @@
         <a:cs typeface="+mn-cs"/>
       </a:defRPr>
     </a:lvl2pPr>
-    <a:lvl3pPr marL="914400" algn="l" defTabSz="914400" rtl="0" eaLnBrk="1" latinLnBrk="0" hangingPunct="1">
-      <a:defRPr sz="1800" kern="1200">
+    <a:lvl3pPr marL="1131570" algn="l" defTabSz="1131570" rtl="0" eaLnBrk="1" latinLnBrk="0" hangingPunct="1">
+      <a:defRPr sz="2200" kern="1200">
         <a:solidFill>
           <a:schemeClr val="tx1"/>
         </a:solidFill>
@@ -43,8 +43,8 @@
         <a:cs typeface="+mn-cs"/>
       </a:defRPr>
     </a:lvl3pPr>
-    <a:lvl4pPr marL="1371600" algn="l" defTabSz="914400" rtl="0" eaLnBrk="1" latinLnBrk="0" hangingPunct="1">
-      <a:defRPr sz="1800" kern="1200">
+    <a:lvl4pPr marL="1697355" algn="l" defTabSz="1131570" rtl="0" eaLnBrk="1" latinLnBrk="0" hangingPunct="1">
+      <a:defRPr sz="2200" kern="1200">
         <a:solidFill>
           <a:schemeClr val="tx1"/>
         </a:solidFill>
@@ -53,8 +53,8 @@
         <a:cs typeface="+mn-cs"/>
       </a:defRPr>
     </a:lvl4pPr>
-    <a:lvl5pPr marL="1828800" algn="l" defTabSz="914400" rtl="0" eaLnBrk="1" latinLnBrk="0" hangingPunct="1">
-      <a:defRPr sz="1800" kern="1200">
+    <a:lvl5pPr marL="2263140" algn="l" defTabSz="1131570" rtl="0" eaLnBrk="1" latinLnBrk="0" hangingPunct="1">
+      <a:defRPr sz="2200" kern="1200">
         <a:solidFill>
           <a:schemeClr val="tx1"/>
         </a:solidFill>
@@ -63,8 +63,8 @@
         <a:cs typeface="+mn-cs"/>
       </a:defRPr>
     </a:lvl5pPr>
-    <a:lvl6pPr marL="2286000" algn="l" defTabSz="914400" rtl="0" eaLnBrk="1" latinLnBrk="0" hangingPunct="1">
-      <a:defRPr sz="1800" kern="1200">
+    <a:lvl6pPr marL="2828925" algn="l" defTabSz="1131570" rtl="0" eaLnBrk="1" latinLnBrk="0" hangingPunct="1">
+      <a:defRPr sz="2200" kern="1200">
         <a:solidFill>
           <a:schemeClr val="tx1"/>
         </a:solidFill>
@@ -73,8 +73,8 @@
         <a:cs typeface="+mn-cs"/>
       </a:defRPr>
     </a:lvl6pPr>
-    <a:lvl7pPr marL="2743200" algn="l" defTabSz="914400" rtl="0" eaLnBrk="1" latinLnBrk="0" hangingPunct="1">
-      <a:defRPr sz="1800" kern="1200">
+    <a:lvl7pPr marL="3394710" algn="l" defTabSz="1131570" rtl="0" eaLnBrk="1" latinLnBrk="0" hangingPunct="1">
+      <a:defRPr sz="2200" kern="1200">
         <a:solidFill>
           <a:schemeClr val="tx1"/>
         </a:solidFill>
@@ -83,8 +83,8 @@
         <a:cs typeface="+mn-cs"/>
       </a:defRPr>
     </a:lvl7pPr>
-    <a:lvl8pPr marL="3200400" algn="l" defTabSz="914400" rtl="0" eaLnBrk="1" latinLnBrk="0" hangingPunct="1">
-      <a:defRPr sz="1800" kern="1200">
+    <a:lvl8pPr marL="3960495" algn="l" defTabSz="1131570" rtl="0" eaLnBrk="1" latinLnBrk="0" hangingPunct="1">
+      <a:defRPr sz="2200" kern="1200">
         <a:solidFill>
           <a:schemeClr val="tx1"/>
         </a:solidFill>
@@ -93,8 +93,8 @@
         <a:cs typeface="+mn-cs"/>
       </a:defRPr>
     </a:lvl8pPr>
-    <a:lvl9pPr marL="3657600" algn="l" defTabSz="914400" rtl="0" eaLnBrk="1" latinLnBrk="0" hangingPunct="1">
-      <a:defRPr sz="1800" kern="1200">
+    <a:lvl9pPr marL="4526280" algn="l" defTabSz="1131570" rtl="0" eaLnBrk="1" latinLnBrk="0" hangingPunct="1">
+      <a:defRPr sz="2200" kern="1200">
         <a:solidFill>
           <a:schemeClr val="tx1"/>
         </a:solidFill>
@@ -136,8 +136,8 @@
         </p:nvSpPr>
         <p:spPr>
           <a:xfrm>
-            <a:off x="529234" y="2236948"/>
-            <a:ext cx="5997972" cy="1543526"/>
+            <a:off x="742594" y="2236951"/>
+            <a:ext cx="8416052" cy="1543527"/>
           </a:xfrm>
         </p:spPr>
         <p:txBody>
@@ -164,8 +164,8 @@
         </p:nvSpPr>
         <p:spPr>
           <a:xfrm>
-            <a:off x="1058466" y="4080510"/>
-            <a:ext cx="4939507" cy="1840230"/>
+            <a:off x="1485186" y="4080512"/>
+            <a:ext cx="6930868" cy="1840229"/>
           </a:xfrm>
         </p:spPr>
         <p:txBody>
@@ -181,7 +181,7 @@
                 </a:solidFill>
               </a:defRPr>
             </a:lvl1pPr>
-            <a:lvl2pPr marL="457200" indent="0" algn="ctr">
+            <a:lvl2pPr marL="565785" indent="0" algn="ctr">
               <a:buNone/>
               <a:defRPr>
                 <a:solidFill>
@@ -191,7 +191,7 @@
                 </a:solidFill>
               </a:defRPr>
             </a:lvl2pPr>
-            <a:lvl3pPr marL="914400" indent="0" algn="ctr">
+            <a:lvl3pPr marL="1131570" indent="0" algn="ctr">
               <a:buNone/>
               <a:defRPr>
                 <a:solidFill>
@@ -201,7 +201,7 @@
                 </a:solidFill>
               </a:defRPr>
             </a:lvl3pPr>
-            <a:lvl4pPr marL="1371600" indent="0" algn="ctr">
+            <a:lvl4pPr marL="1697355" indent="0" algn="ctr">
               <a:buNone/>
               <a:defRPr>
                 <a:solidFill>
@@ -211,7 +211,7 @@
                 </a:solidFill>
               </a:defRPr>
             </a:lvl4pPr>
-            <a:lvl5pPr marL="1828800" indent="0" algn="ctr">
+            <a:lvl5pPr marL="2263140" indent="0" algn="ctr">
               <a:buNone/>
               <a:defRPr>
                 <a:solidFill>
@@ -221,7 +221,7 @@
                 </a:solidFill>
               </a:defRPr>
             </a:lvl5pPr>
-            <a:lvl6pPr marL="2286000" indent="0" algn="ctr">
+            <a:lvl6pPr marL="2828925" indent="0" algn="ctr">
               <a:buNone/>
               <a:defRPr>
                 <a:solidFill>
@@ -231,7 +231,7 @@
                 </a:solidFill>
               </a:defRPr>
             </a:lvl6pPr>
-            <a:lvl7pPr marL="2743200" indent="0" algn="ctr">
+            <a:lvl7pPr marL="3394710" indent="0" algn="ctr">
               <a:buNone/>
               <a:defRPr>
                 <a:solidFill>
@@ -241,7 +241,7 @@
                 </a:solidFill>
               </a:defRPr>
             </a:lvl7pPr>
-            <a:lvl8pPr marL="3200400" indent="0" algn="ctr">
+            <a:lvl8pPr marL="3960495" indent="0" algn="ctr">
               <a:buNone/>
               <a:defRPr>
                 <a:solidFill>
@@ -251,7 +251,7 @@
                 </a:solidFill>
               </a:defRPr>
             </a:lvl8pPr>
-            <a:lvl9pPr marL="3657600" indent="0" algn="ctr">
+            <a:lvl9pPr marL="4526280" indent="0" algn="ctr">
               <a:buNone/>
               <a:defRPr>
                 <a:solidFill>
@@ -288,7 +288,7 @@
           <a:p>
             <a:fld id="{A60EB551-423D-4362-9538-EAD90C18ABEF}" type="datetimeFigureOut">
               <a:rPr lang="fr-FR" smtClean="0"/>
-              <a:t>22/03/2017</a:t>
+              <a:t>24/03/2017</a:t>
             </a:fld>
             <a:endParaRPr lang="fr-FR"/>
           </a:p>
@@ -458,7 +458,7 @@
           <a:p>
             <a:fld id="{A60EB551-423D-4362-9538-EAD90C18ABEF}" type="datetimeFigureOut">
               <a:rPr lang="fr-FR" smtClean="0"/>
-              <a:t>22/03/2017</a:t>
+              <a:t>24/03/2017</a:t>
             </a:fld>
             <a:endParaRPr lang="fr-FR"/>
           </a:p>
@@ -548,8 +548,8 @@
         </p:nvSpPr>
         <p:spPr>
           <a:xfrm>
-            <a:off x="3836938" y="416720"/>
-            <a:ext cx="1190774" cy="8874443"/>
+            <a:off x="5383798" y="416723"/>
+            <a:ext cx="1670834" cy="8874443"/>
           </a:xfrm>
         </p:spPr>
         <p:txBody>
@@ -576,8 +576,8 @@
         </p:nvSpPr>
         <p:spPr>
           <a:xfrm>
-            <a:off x="264617" y="416720"/>
-            <a:ext cx="3454715" cy="8874443"/>
+            <a:off x="371305" y="416723"/>
+            <a:ext cx="4847482" cy="8874443"/>
           </a:xfrm>
         </p:spPr>
         <p:txBody>
@@ -638,7 +638,7 @@
           <a:p>
             <a:fld id="{A60EB551-423D-4362-9538-EAD90C18ABEF}" type="datetimeFigureOut">
               <a:rPr lang="fr-FR" smtClean="0"/>
-              <a:t>22/03/2017</a:t>
+              <a:t>24/03/2017</a:t>
             </a:fld>
             <a:endParaRPr lang="fr-FR"/>
           </a:p>
@@ -808,7 +808,7 @@
           <a:p>
             <a:fld id="{A60EB551-423D-4362-9538-EAD90C18ABEF}" type="datetimeFigureOut">
               <a:rPr lang="fr-FR" smtClean="0"/>
-              <a:t>22/03/2017</a:t>
+              <a:t>24/03/2017</a:t>
             </a:fld>
             <a:endParaRPr lang="fr-FR"/>
           </a:p>
@@ -898,15 +898,15 @@
         </p:nvSpPr>
         <p:spPr>
           <a:xfrm>
-            <a:off x="557411" y="4627247"/>
-            <a:ext cx="5997972" cy="1430179"/>
+            <a:off x="782131" y="4627249"/>
+            <a:ext cx="8416052" cy="1430178"/>
           </a:xfrm>
         </p:spPr>
         <p:txBody>
           <a:bodyPr anchor="t"/>
           <a:lstStyle>
             <a:lvl1pPr algn="l">
-              <a:defRPr sz="4000" b="1" cap="all"/>
+              <a:defRPr sz="5000" b="1" cap="all"/>
             </a:lvl1pPr>
           </a:lstStyle>
           <a:p>
@@ -930,14 +930,34 @@
         </p:nvSpPr>
         <p:spPr>
           <a:xfrm>
-            <a:off x="557411" y="3052050"/>
-            <a:ext cx="5997972" cy="1575197"/>
+            <a:off x="782131" y="3052050"/>
+            <a:ext cx="8416052" cy="1575198"/>
           </a:xfrm>
         </p:spPr>
         <p:txBody>
           <a:bodyPr anchor="b"/>
           <a:lstStyle>
             <a:lvl1pPr marL="0" indent="0">
+              <a:buNone/>
+              <a:defRPr sz="2500">
+                <a:solidFill>
+                  <a:schemeClr val="tx1">
+                    <a:tint val="75000"/>
+                  </a:schemeClr>
+                </a:solidFill>
+              </a:defRPr>
+            </a:lvl1pPr>
+            <a:lvl2pPr marL="565785" indent="0">
+              <a:buNone/>
+              <a:defRPr sz="2200">
+                <a:solidFill>
+                  <a:schemeClr val="tx1">
+                    <a:tint val="75000"/>
+                  </a:schemeClr>
+                </a:solidFill>
+              </a:defRPr>
+            </a:lvl2pPr>
+            <a:lvl3pPr marL="1131570" indent="0">
               <a:buNone/>
               <a:defRPr sz="2000">
                 <a:solidFill>
@@ -946,30 +966,10 @@
                   </a:schemeClr>
                 </a:solidFill>
               </a:defRPr>
-            </a:lvl1pPr>
-            <a:lvl2pPr marL="457200" indent="0">
-              <a:buNone/>
-              <a:defRPr sz="1800">
-                <a:solidFill>
-                  <a:schemeClr val="tx1">
-                    <a:tint val="75000"/>
-                  </a:schemeClr>
-                </a:solidFill>
-              </a:defRPr>
-            </a:lvl2pPr>
-            <a:lvl3pPr marL="914400" indent="0">
-              <a:buNone/>
-              <a:defRPr sz="1600">
-                <a:solidFill>
-                  <a:schemeClr val="tx1">
-                    <a:tint val="75000"/>
-                  </a:schemeClr>
-                </a:solidFill>
-              </a:defRPr>
             </a:lvl3pPr>
-            <a:lvl4pPr marL="1371600" indent="0">
-              <a:buNone/>
-              <a:defRPr sz="1400">
+            <a:lvl4pPr marL="1697355" indent="0">
+              <a:buNone/>
+              <a:defRPr sz="1700">
                 <a:solidFill>
                   <a:schemeClr val="tx1">
                     <a:tint val="75000"/>
@@ -977,9 +977,9 @@
                 </a:solidFill>
               </a:defRPr>
             </a:lvl4pPr>
-            <a:lvl5pPr marL="1828800" indent="0">
-              <a:buNone/>
-              <a:defRPr sz="1400">
+            <a:lvl5pPr marL="2263140" indent="0">
+              <a:buNone/>
+              <a:defRPr sz="1700">
                 <a:solidFill>
                   <a:schemeClr val="tx1">
                     <a:tint val="75000"/>
@@ -987,9 +987,9 @@
                 </a:solidFill>
               </a:defRPr>
             </a:lvl5pPr>
-            <a:lvl6pPr marL="2286000" indent="0">
-              <a:buNone/>
-              <a:defRPr sz="1400">
+            <a:lvl6pPr marL="2828925" indent="0">
+              <a:buNone/>
+              <a:defRPr sz="1700">
                 <a:solidFill>
                   <a:schemeClr val="tx1">
                     <a:tint val="75000"/>
@@ -997,9 +997,9 @@
                 </a:solidFill>
               </a:defRPr>
             </a:lvl6pPr>
-            <a:lvl7pPr marL="2743200" indent="0">
-              <a:buNone/>
-              <a:defRPr sz="1400">
+            <a:lvl7pPr marL="3394710" indent="0">
+              <a:buNone/>
+              <a:defRPr sz="1700">
                 <a:solidFill>
                   <a:schemeClr val="tx1">
                     <a:tint val="75000"/>
@@ -1007,9 +1007,9 @@
                 </a:solidFill>
               </a:defRPr>
             </a:lvl7pPr>
-            <a:lvl8pPr marL="3200400" indent="0">
-              <a:buNone/>
-              <a:defRPr sz="1400">
+            <a:lvl8pPr marL="3960495" indent="0">
+              <a:buNone/>
+              <a:defRPr sz="1700">
                 <a:solidFill>
                   <a:schemeClr val="tx1">
                     <a:tint val="75000"/>
@@ -1017,9 +1017,9 @@
                 </a:solidFill>
               </a:defRPr>
             </a:lvl8pPr>
-            <a:lvl9pPr marL="3657600" indent="0">
-              <a:buNone/>
-              <a:defRPr sz="1400">
+            <a:lvl9pPr marL="4526280" indent="0">
+              <a:buNone/>
+              <a:defRPr sz="1700">
                 <a:solidFill>
                   <a:schemeClr val="tx1">
                     <a:tint val="75000"/>
@@ -1054,7 +1054,7 @@
           <a:p>
             <a:fld id="{A60EB551-423D-4362-9538-EAD90C18ABEF}" type="datetimeFigureOut">
               <a:rPr lang="fr-FR" smtClean="0"/>
-              <a:t>22/03/2017</a:t>
+              <a:t>24/03/2017</a:t>
             </a:fld>
             <a:endParaRPr lang="fr-FR"/>
           </a:p>
@@ -1167,39 +1167,39 @@
         </p:nvSpPr>
         <p:spPr>
           <a:xfrm>
-            <a:off x="264617" y="2426972"/>
-            <a:ext cx="2322744" cy="6864191"/>
+            <a:off x="371303" y="2426976"/>
+            <a:ext cx="3259158" cy="6864190"/>
           </a:xfrm>
         </p:spPr>
         <p:txBody>
           <a:bodyPr/>
           <a:lstStyle>
             <a:lvl1pPr>
-              <a:defRPr sz="2800"/>
+              <a:defRPr sz="3500"/>
             </a:lvl1pPr>
             <a:lvl2pPr>
-              <a:defRPr sz="2400"/>
+              <a:defRPr sz="3000"/>
             </a:lvl2pPr>
             <a:lvl3pPr>
-              <a:defRPr sz="2000"/>
+              <a:defRPr sz="2500"/>
             </a:lvl3pPr>
             <a:lvl4pPr>
-              <a:defRPr sz="1800"/>
+              <a:defRPr sz="2200"/>
             </a:lvl4pPr>
             <a:lvl5pPr>
-              <a:defRPr sz="1800"/>
+              <a:defRPr sz="2200"/>
             </a:lvl5pPr>
             <a:lvl6pPr>
-              <a:defRPr sz="1800"/>
+              <a:defRPr sz="2200"/>
             </a:lvl6pPr>
             <a:lvl7pPr>
-              <a:defRPr sz="1800"/>
+              <a:defRPr sz="2200"/>
             </a:lvl7pPr>
             <a:lvl8pPr>
-              <a:defRPr sz="1800"/>
+              <a:defRPr sz="2200"/>
             </a:lvl8pPr>
             <a:lvl9pPr>
-              <a:defRPr sz="1800"/>
+              <a:defRPr sz="2200"/>
             </a:lvl9pPr>
           </a:lstStyle>
           <a:p>
@@ -1252,39 +1252,39 @@
         </p:nvSpPr>
         <p:spPr>
           <a:xfrm>
-            <a:off x="2704969" y="2426972"/>
-            <a:ext cx="2322744" cy="6864191"/>
+            <a:off x="3795483" y="2426976"/>
+            <a:ext cx="3259158" cy="6864190"/>
           </a:xfrm>
         </p:spPr>
         <p:txBody>
           <a:bodyPr/>
           <a:lstStyle>
             <a:lvl1pPr>
-              <a:defRPr sz="2800"/>
+              <a:defRPr sz="3500"/>
             </a:lvl1pPr>
             <a:lvl2pPr>
-              <a:defRPr sz="2400"/>
+              <a:defRPr sz="3000"/>
             </a:lvl2pPr>
             <a:lvl3pPr>
-              <a:defRPr sz="2000"/>
+              <a:defRPr sz="2500"/>
             </a:lvl3pPr>
             <a:lvl4pPr>
-              <a:defRPr sz="1800"/>
+              <a:defRPr sz="2200"/>
             </a:lvl4pPr>
             <a:lvl5pPr>
-              <a:defRPr sz="1800"/>
+              <a:defRPr sz="2200"/>
             </a:lvl5pPr>
             <a:lvl6pPr>
-              <a:defRPr sz="1800"/>
+              <a:defRPr sz="2200"/>
             </a:lvl6pPr>
             <a:lvl7pPr>
-              <a:defRPr sz="1800"/>
+              <a:defRPr sz="2200"/>
             </a:lvl7pPr>
             <a:lvl8pPr>
-              <a:defRPr sz="1800"/>
+              <a:defRPr sz="2200"/>
             </a:lvl8pPr>
             <a:lvl9pPr>
-              <a:defRPr sz="1800"/>
+              <a:defRPr sz="2200"/>
             </a:lvl9pPr>
           </a:lstStyle>
           <a:p>
@@ -1342,7 +1342,7 @@
           <a:p>
             <a:fld id="{A60EB551-423D-4362-9538-EAD90C18ABEF}" type="datetimeFigureOut">
               <a:rPr lang="fr-FR" smtClean="0"/>
-              <a:t>22/03/2017</a:t>
+              <a:t>24/03/2017</a:t>
             </a:fld>
             <a:endParaRPr lang="fr-FR"/>
           </a:p>
@@ -1432,8 +1432,8 @@
         </p:nvSpPr>
         <p:spPr>
           <a:xfrm>
-            <a:off x="352822" y="288370"/>
-            <a:ext cx="6350794" cy="1200150"/>
+            <a:off x="495065" y="288371"/>
+            <a:ext cx="8911114" cy="1200151"/>
           </a:xfrm>
         </p:spPr>
         <p:txBody>
@@ -1464,8 +1464,8 @@
         </p:nvSpPr>
         <p:spPr>
           <a:xfrm>
-            <a:off x="352823" y="1611869"/>
-            <a:ext cx="3117819" cy="671750"/>
+            <a:off x="495064" y="1611871"/>
+            <a:ext cx="4374767" cy="671750"/>
           </a:xfrm>
         </p:spPr>
         <p:txBody>
@@ -1473,39 +1473,39 @@
           <a:lstStyle>
             <a:lvl1pPr marL="0" indent="0">
               <a:buNone/>
-              <a:defRPr sz="2400" b="1"/>
+              <a:defRPr sz="3000" b="1"/>
             </a:lvl1pPr>
-            <a:lvl2pPr marL="457200" indent="0">
+            <a:lvl2pPr marL="565785" indent="0">
+              <a:buNone/>
+              <a:defRPr sz="2500" b="1"/>
+            </a:lvl2pPr>
+            <a:lvl3pPr marL="1131570" indent="0">
+              <a:buNone/>
+              <a:defRPr sz="2200" b="1"/>
+            </a:lvl3pPr>
+            <a:lvl4pPr marL="1697355" indent="0">
               <a:buNone/>
               <a:defRPr sz="2000" b="1"/>
-            </a:lvl2pPr>
-            <a:lvl3pPr marL="914400" indent="0">
-              <a:buNone/>
-              <a:defRPr sz="1800" b="1"/>
-            </a:lvl3pPr>
-            <a:lvl4pPr marL="1371600" indent="0">
-              <a:buNone/>
-              <a:defRPr sz="1600" b="1"/>
             </a:lvl4pPr>
-            <a:lvl5pPr marL="1828800" indent="0">
-              <a:buNone/>
-              <a:defRPr sz="1600" b="1"/>
+            <a:lvl5pPr marL="2263140" indent="0">
+              <a:buNone/>
+              <a:defRPr sz="2000" b="1"/>
             </a:lvl5pPr>
-            <a:lvl6pPr marL="2286000" indent="0">
-              <a:buNone/>
-              <a:defRPr sz="1600" b="1"/>
+            <a:lvl6pPr marL="2828925" indent="0">
+              <a:buNone/>
+              <a:defRPr sz="2000" b="1"/>
             </a:lvl6pPr>
-            <a:lvl7pPr marL="2743200" indent="0">
-              <a:buNone/>
-              <a:defRPr sz="1600" b="1"/>
+            <a:lvl7pPr marL="3394710" indent="0">
+              <a:buNone/>
+              <a:defRPr sz="2000" b="1"/>
             </a:lvl7pPr>
-            <a:lvl8pPr marL="3200400" indent="0">
-              <a:buNone/>
-              <a:defRPr sz="1600" b="1"/>
+            <a:lvl8pPr marL="3960495" indent="0">
+              <a:buNone/>
+              <a:defRPr sz="2000" b="1"/>
             </a:lvl8pPr>
-            <a:lvl9pPr marL="3657600" indent="0">
-              <a:buNone/>
-              <a:defRPr sz="1600" b="1"/>
+            <a:lvl9pPr marL="4526280" indent="0">
+              <a:buNone/>
+              <a:defRPr sz="2000" b="1"/>
             </a:lvl9pPr>
           </a:lstStyle>
           <a:p>
@@ -1529,39 +1529,39 @@
         </p:nvSpPr>
         <p:spPr>
           <a:xfrm>
-            <a:off x="352823" y="2283619"/>
-            <a:ext cx="3117819" cy="4148852"/>
+            <a:off x="495064" y="2283622"/>
+            <a:ext cx="4374767" cy="4148852"/>
           </a:xfrm>
         </p:spPr>
         <p:txBody>
           <a:bodyPr/>
           <a:lstStyle>
             <a:lvl1pPr>
-              <a:defRPr sz="2400"/>
+              <a:defRPr sz="3000"/>
             </a:lvl1pPr>
             <a:lvl2pPr>
-              <a:defRPr sz="2000"/>
+              <a:defRPr sz="2500"/>
             </a:lvl2pPr>
             <a:lvl3pPr>
-              <a:defRPr sz="1800"/>
+              <a:defRPr sz="2200"/>
             </a:lvl3pPr>
             <a:lvl4pPr>
-              <a:defRPr sz="1600"/>
+              <a:defRPr sz="2000"/>
             </a:lvl4pPr>
             <a:lvl5pPr>
-              <a:defRPr sz="1600"/>
+              <a:defRPr sz="2000"/>
             </a:lvl5pPr>
             <a:lvl6pPr>
-              <a:defRPr sz="1600"/>
+              <a:defRPr sz="2000"/>
             </a:lvl6pPr>
             <a:lvl7pPr>
-              <a:defRPr sz="1600"/>
+              <a:defRPr sz="2000"/>
             </a:lvl7pPr>
             <a:lvl8pPr>
-              <a:defRPr sz="1600"/>
+              <a:defRPr sz="2000"/>
             </a:lvl8pPr>
             <a:lvl9pPr>
-              <a:defRPr sz="1600"/>
+              <a:defRPr sz="2000"/>
             </a:lvl9pPr>
           </a:lstStyle>
           <a:p>
@@ -1614,8 +1614,8 @@
         </p:nvSpPr>
         <p:spPr>
           <a:xfrm>
-            <a:off x="3584573" y="1611869"/>
-            <a:ext cx="3119044" cy="671750"/>
+            <a:off x="5029695" y="1611871"/>
+            <a:ext cx="4376485" cy="671750"/>
           </a:xfrm>
         </p:spPr>
         <p:txBody>
@@ -1623,39 +1623,39 @@
           <a:lstStyle>
             <a:lvl1pPr marL="0" indent="0">
               <a:buNone/>
-              <a:defRPr sz="2400" b="1"/>
+              <a:defRPr sz="3000" b="1"/>
             </a:lvl1pPr>
-            <a:lvl2pPr marL="457200" indent="0">
+            <a:lvl2pPr marL="565785" indent="0">
+              <a:buNone/>
+              <a:defRPr sz="2500" b="1"/>
+            </a:lvl2pPr>
+            <a:lvl3pPr marL="1131570" indent="0">
+              <a:buNone/>
+              <a:defRPr sz="2200" b="1"/>
+            </a:lvl3pPr>
+            <a:lvl4pPr marL="1697355" indent="0">
               <a:buNone/>
               <a:defRPr sz="2000" b="1"/>
-            </a:lvl2pPr>
-            <a:lvl3pPr marL="914400" indent="0">
-              <a:buNone/>
-              <a:defRPr sz="1800" b="1"/>
-            </a:lvl3pPr>
-            <a:lvl4pPr marL="1371600" indent="0">
-              <a:buNone/>
-              <a:defRPr sz="1600" b="1"/>
             </a:lvl4pPr>
-            <a:lvl5pPr marL="1828800" indent="0">
-              <a:buNone/>
-              <a:defRPr sz="1600" b="1"/>
+            <a:lvl5pPr marL="2263140" indent="0">
+              <a:buNone/>
+              <a:defRPr sz="2000" b="1"/>
             </a:lvl5pPr>
-            <a:lvl6pPr marL="2286000" indent="0">
-              <a:buNone/>
-              <a:defRPr sz="1600" b="1"/>
+            <a:lvl6pPr marL="2828925" indent="0">
+              <a:buNone/>
+              <a:defRPr sz="2000" b="1"/>
             </a:lvl6pPr>
-            <a:lvl7pPr marL="2743200" indent="0">
-              <a:buNone/>
-              <a:defRPr sz="1600" b="1"/>
+            <a:lvl7pPr marL="3394710" indent="0">
+              <a:buNone/>
+              <a:defRPr sz="2000" b="1"/>
             </a:lvl7pPr>
-            <a:lvl8pPr marL="3200400" indent="0">
-              <a:buNone/>
-              <a:defRPr sz="1600" b="1"/>
+            <a:lvl8pPr marL="3960495" indent="0">
+              <a:buNone/>
+              <a:defRPr sz="2000" b="1"/>
             </a:lvl8pPr>
-            <a:lvl9pPr marL="3657600" indent="0">
-              <a:buNone/>
-              <a:defRPr sz="1600" b="1"/>
+            <a:lvl9pPr marL="4526280" indent="0">
+              <a:buNone/>
+              <a:defRPr sz="2000" b="1"/>
             </a:lvl9pPr>
           </a:lstStyle>
           <a:p>
@@ -1679,39 +1679,39 @@
         </p:nvSpPr>
         <p:spPr>
           <a:xfrm>
-            <a:off x="3584573" y="2283619"/>
-            <a:ext cx="3119044" cy="4148852"/>
+            <a:off x="5029695" y="2283622"/>
+            <a:ext cx="4376485" cy="4148852"/>
           </a:xfrm>
         </p:spPr>
         <p:txBody>
           <a:bodyPr/>
           <a:lstStyle>
             <a:lvl1pPr>
-              <a:defRPr sz="2400"/>
+              <a:defRPr sz="3000"/>
             </a:lvl1pPr>
             <a:lvl2pPr>
-              <a:defRPr sz="2000"/>
+              <a:defRPr sz="2500"/>
             </a:lvl2pPr>
             <a:lvl3pPr>
-              <a:defRPr sz="1800"/>
+              <a:defRPr sz="2200"/>
             </a:lvl3pPr>
             <a:lvl4pPr>
-              <a:defRPr sz="1600"/>
+              <a:defRPr sz="2000"/>
             </a:lvl4pPr>
             <a:lvl5pPr>
-              <a:defRPr sz="1600"/>
+              <a:defRPr sz="2000"/>
             </a:lvl5pPr>
             <a:lvl6pPr>
-              <a:defRPr sz="1600"/>
+              <a:defRPr sz="2000"/>
             </a:lvl6pPr>
             <a:lvl7pPr>
-              <a:defRPr sz="1600"/>
+              <a:defRPr sz="2000"/>
             </a:lvl7pPr>
             <a:lvl8pPr>
-              <a:defRPr sz="1600"/>
+              <a:defRPr sz="2000"/>
             </a:lvl8pPr>
             <a:lvl9pPr>
-              <a:defRPr sz="1600"/>
+              <a:defRPr sz="2000"/>
             </a:lvl9pPr>
           </a:lstStyle>
           <a:p>
@@ -1769,7 +1769,7 @@
           <a:p>
             <a:fld id="{A60EB551-423D-4362-9538-EAD90C18ABEF}" type="datetimeFigureOut">
               <a:rPr lang="fr-FR" smtClean="0"/>
-              <a:t>22/03/2017</a:t>
+              <a:t>24/03/2017</a:t>
             </a:fld>
             <a:endParaRPr lang="fr-FR"/>
           </a:p>
@@ -1887,7 +1887,7 @@
           <a:p>
             <a:fld id="{A60EB551-423D-4362-9538-EAD90C18ABEF}" type="datetimeFigureOut">
               <a:rPr lang="fr-FR" smtClean="0"/>
-              <a:t>22/03/2017</a:t>
+              <a:t>24/03/2017</a:t>
             </a:fld>
             <a:endParaRPr lang="fr-FR"/>
           </a:p>
@@ -1982,7 +1982,7 @@
           <a:p>
             <a:fld id="{A60EB551-423D-4362-9538-EAD90C18ABEF}" type="datetimeFigureOut">
               <a:rPr lang="fr-FR" smtClean="0"/>
-              <a:t>22/03/2017</a:t>
+              <a:t>24/03/2017</a:t>
             </a:fld>
             <a:endParaRPr lang="fr-FR"/>
           </a:p>
@@ -2072,15 +2072,15 @@
         </p:nvSpPr>
         <p:spPr>
           <a:xfrm>
-            <a:off x="352822" y="286703"/>
-            <a:ext cx="2321520" cy="1220153"/>
+            <a:off x="495064" y="286705"/>
+            <a:ext cx="3257439" cy="1220152"/>
           </a:xfrm>
         </p:spPr>
         <p:txBody>
           <a:bodyPr anchor="b"/>
           <a:lstStyle>
             <a:lvl1pPr algn="l">
-              <a:defRPr sz="2000" b="1"/>
+              <a:defRPr sz="2500" b="1"/>
             </a:lvl1pPr>
           </a:lstStyle>
           <a:p>
@@ -2104,39 +2104,39 @@
         </p:nvSpPr>
         <p:spPr>
           <a:xfrm>
-            <a:off x="2758871" y="286704"/>
-            <a:ext cx="3944746" cy="6145769"/>
+            <a:off x="3871110" y="286707"/>
+            <a:ext cx="5535069" cy="6145769"/>
           </a:xfrm>
         </p:spPr>
         <p:txBody>
           <a:bodyPr/>
           <a:lstStyle>
             <a:lvl1pPr>
-              <a:defRPr sz="3200"/>
+              <a:defRPr sz="4000"/>
             </a:lvl1pPr>
             <a:lvl2pPr>
-              <a:defRPr sz="2800"/>
+              <a:defRPr sz="3500"/>
             </a:lvl2pPr>
             <a:lvl3pPr>
-              <a:defRPr sz="2400"/>
+              <a:defRPr sz="3000"/>
             </a:lvl3pPr>
             <a:lvl4pPr>
-              <a:defRPr sz="2000"/>
+              <a:defRPr sz="2500"/>
             </a:lvl4pPr>
             <a:lvl5pPr>
-              <a:defRPr sz="2000"/>
+              <a:defRPr sz="2500"/>
             </a:lvl5pPr>
             <a:lvl6pPr>
-              <a:defRPr sz="2000"/>
+              <a:defRPr sz="2500"/>
             </a:lvl6pPr>
             <a:lvl7pPr>
-              <a:defRPr sz="2000"/>
+              <a:defRPr sz="2500"/>
             </a:lvl7pPr>
             <a:lvl8pPr>
-              <a:defRPr sz="2000"/>
+              <a:defRPr sz="2500"/>
             </a:lvl8pPr>
             <a:lvl9pPr>
-              <a:defRPr sz="2000"/>
+              <a:defRPr sz="2500"/>
             </a:lvl9pPr>
           </a:lstStyle>
           <a:p>
@@ -2189,8 +2189,8 @@
         </p:nvSpPr>
         <p:spPr>
           <a:xfrm>
-            <a:off x="352822" y="1506856"/>
-            <a:ext cx="2321520" cy="4925616"/>
+            <a:off x="495064" y="1506856"/>
+            <a:ext cx="3257439" cy="4925616"/>
           </a:xfrm>
         </p:spPr>
         <p:txBody>
@@ -2198,39 +2198,39 @@
           <a:lstStyle>
             <a:lvl1pPr marL="0" indent="0">
               <a:buNone/>
-              <a:defRPr sz="1400"/>
+              <a:defRPr sz="1700"/>
             </a:lvl1pPr>
-            <a:lvl2pPr marL="457200" indent="0">
+            <a:lvl2pPr marL="565785" indent="0">
+              <a:buNone/>
+              <a:defRPr sz="1500"/>
+            </a:lvl2pPr>
+            <a:lvl3pPr marL="1131570" indent="0">
               <a:buNone/>
               <a:defRPr sz="1200"/>
-            </a:lvl2pPr>
-            <a:lvl3pPr marL="914400" indent="0">
-              <a:buNone/>
-              <a:defRPr sz="1000"/>
             </a:lvl3pPr>
-            <a:lvl4pPr marL="1371600" indent="0">
-              <a:buNone/>
-              <a:defRPr sz="900"/>
+            <a:lvl4pPr marL="1697355" indent="0">
+              <a:buNone/>
+              <a:defRPr sz="1100"/>
             </a:lvl4pPr>
-            <a:lvl5pPr marL="1828800" indent="0">
-              <a:buNone/>
-              <a:defRPr sz="900"/>
+            <a:lvl5pPr marL="2263140" indent="0">
+              <a:buNone/>
+              <a:defRPr sz="1100"/>
             </a:lvl5pPr>
-            <a:lvl6pPr marL="2286000" indent="0">
-              <a:buNone/>
-              <a:defRPr sz="900"/>
+            <a:lvl6pPr marL="2828925" indent="0">
+              <a:buNone/>
+              <a:defRPr sz="1100"/>
             </a:lvl6pPr>
-            <a:lvl7pPr marL="2743200" indent="0">
-              <a:buNone/>
-              <a:defRPr sz="900"/>
+            <a:lvl7pPr marL="3394710" indent="0">
+              <a:buNone/>
+              <a:defRPr sz="1100"/>
             </a:lvl7pPr>
-            <a:lvl8pPr marL="3200400" indent="0">
-              <a:buNone/>
-              <a:defRPr sz="900"/>
+            <a:lvl8pPr marL="3960495" indent="0">
+              <a:buNone/>
+              <a:defRPr sz="1100"/>
             </a:lvl8pPr>
-            <a:lvl9pPr marL="3657600" indent="0">
-              <a:buNone/>
-              <a:defRPr sz="900"/>
+            <a:lvl9pPr marL="4526280" indent="0">
+              <a:buNone/>
+              <a:defRPr sz="1100"/>
             </a:lvl9pPr>
           </a:lstStyle>
           <a:p>
@@ -2259,7 +2259,7 @@
           <a:p>
             <a:fld id="{A60EB551-423D-4362-9538-EAD90C18ABEF}" type="datetimeFigureOut">
               <a:rPr lang="fr-FR" smtClean="0"/>
-              <a:t>22/03/2017</a:t>
+              <a:t>24/03/2017</a:t>
             </a:fld>
             <a:endParaRPr lang="fr-FR"/>
           </a:p>
@@ -2349,15 +2349,15 @@
         </p:nvSpPr>
         <p:spPr>
           <a:xfrm>
-            <a:off x="1383111" y="5040631"/>
-            <a:ext cx="4233863" cy="595075"/>
+            <a:off x="1940713" y="5040635"/>
+            <a:ext cx="5940743" cy="595074"/>
           </a:xfrm>
         </p:spPr>
         <p:txBody>
           <a:bodyPr anchor="b"/>
           <a:lstStyle>
             <a:lvl1pPr algn="l">
-              <a:defRPr sz="2000" b="1"/>
+              <a:defRPr sz="2500" b="1"/>
             </a:lvl1pPr>
           </a:lstStyle>
           <a:p>
@@ -2381,8 +2381,8 @@
         </p:nvSpPr>
         <p:spPr>
           <a:xfrm>
-            <a:off x="1383111" y="643413"/>
-            <a:ext cx="4233863" cy="4320540"/>
+            <a:off x="1940713" y="643414"/>
+            <a:ext cx="5940743" cy="4320540"/>
           </a:xfrm>
         </p:spPr>
         <p:txBody>
@@ -2390,39 +2390,39 @@
           <a:lstStyle>
             <a:lvl1pPr marL="0" indent="0">
               <a:buNone/>
-              <a:defRPr sz="3200"/>
+              <a:defRPr sz="4000"/>
             </a:lvl1pPr>
-            <a:lvl2pPr marL="457200" indent="0">
-              <a:buNone/>
-              <a:defRPr sz="2800"/>
+            <a:lvl2pPr marL="565785" indent="0">
+              <a:buNone/>
+              <a:defRPr sz="3500"/>
             </a:lvl2pPr>
-            <a:lvl3pPr marL="914400" indent="0">
-              <a:buNone/>
-              <a:defRPr sz="2400"/>
+            <a:lvl3pPr marL="1131570" indent="0">
+              <a:buNone/>
+              <a:defRPr sz="3000"/>
             </a:lvl3pPr>
-            <a:lvl4pPr marL="1371600" indent="0">
-              <a:buNone/>
-              <a:defRPr sz="2000"/>
+            <a:lvl4pPr marL="1697355" indent="0">
+              <a:buNone/>
+              <a:defRPr sz="2500"/>
             </a:lvl4pPr>
-            <a:lvl5pPr marL="1828800" indent="0">
-              <a:buNone/>
-              <a:defRPr sz="2000"/>
+            <a:lvl5pPr marL="2263140" indent="0">
+              <a:buNone/>
+              <a:defRPr sz="2500"/>
             </a:lvl5pPr>
-            <a:lvl6pPr marL="2286000" indent="0">
-              <a:buNone/>
-              <a:defRPr sz="2000"/>
+            <a:lvl6pPr marL="2828925" indent="0">
+              <a:buNone/>
+              <a:defRPr sz="2500"/>
             </a:lvl6pPr>
-            <a:lvl7pPr marL="2743200" indent="0">
-              <a:buNone/>
-              <a:defRPr sz="2000"/>
+            <a:lvl7pPr marL="3394710" indent="0">
+              <a:buNone/>
+              <a:defRPr sz="2500"/>
             </a:lvl7pPr>
-            <a:lvl8pPr marL="3200400" indent="0">
-              <a:buNone/>
-              <a:defRPr sz="2000"/>
+            <a:lvl8pPr marL="3960495" indent="0">
+              <a:buNone/>
+              <a:defRPr sz="2500"/>
             </a:lvl8pPr>
-            <a:lvl9pPr marL="3657600" indent="0">
-              <a:buNone/>
-              <a:defRPr sz="2000"/>
+            <a:lvl9pPr marL="4526280" indent="0">
+              <a:buNone/>
+              <a:defRPr sz="2500"/>
             </a:lvl9pPr>
           </a:lstStyle>
           <a:p>
@@ -2442,8 +2442,8 @@
         </p:nvSpPr>
         <p:spPr>
           <a:xfrm>
-            <a:off x="1383111" y="5635706"/>
-            <a:ext cx="4233863" cy="845105"/>
+            <a:off x="1940713" y="5635708"/>
+            <a:ext cx="5940743" cy="845104"/>
           </a:xfrm>
         </p:spPr>
         <p:txBody>
@@ -2451,39 +2451,39 @@
           <a:lstStyle>
             <a:lvl1pPr marL="0" indent="0">
               <a:buNone/>
-              <a:defRPr sz="1400"/>
+              <a:defRPr sz="1700"/>
             </a:lvl1pPr>
-            <a:lvl2pPr marL="457200" indent="0">
+            <a:lvl2pPr marL="565785" indent="0">
+              <a:buNone/>
+              <a:defRPr sz="1500"/>
+            </a:lvl2pPr>
+            <a:lvl3pPr marL="1131570" indent="0">
               <a:buNone/>
               <a:defRPr sz="1200"/>
-            </a:lvl2pPr>
-            <a:lvl3pPr marL="914400" indent="0">
-              <a:buNone/>
-              <a:defRPr sz="1000"/>
             </a:lvl3pPr>
-            <a:lvl4pPr marL="1371600" indent="0">
-              <a:buNone/>
-              <a:defRPr sz="900"/>
+            <a:lvl4pPr marL="1697355" indent="0">
+              <a:buNone/>
+              <a:defRPr sz="1100"/>
             </a:lvl4pPr>
-            <a:lvl5pPr marL="1828800" indent="0">
-              <a:buNone/>
-              <a:defRPr sz="900"/>
+            <a:lvl5pPr marL="2263140" indent="0">
+              <a:buNone/>
+              <a:defRPr sz="1100"/>
             </a:lvl5pPr>
-            <a:lvl6pPr marL="2286000" indent="0">
-              <a:buNone/>
-              <a:defRPr sz="900"/>
+            <a:lvl6pPr marL="2828925" indent="0">
+              <a:buNone/>
+              <a:defRPr sz="1100"/>
             </a:lvl6pPr>
-            <a:lvl7pPr marL="2743200" indent="0">
-              <a:buNone/>
-              <a:defRPr sz="900"/>
+            <a:lvl7pPr marL="3394710" indent="0">
+              <a:buNone/>
+              <a:defRPr sz="1100"/>
             </a:lvl7pPr>
-            <a:lvl8pPr marL="3200400" indent="0">
-              <a:buNone/>
-              <a:defRPr sz="900"/>
+            <a:lvl8pPr marL="3960495" indent="0">
+              <a:buNone/>
+              <a:defRPr sz="1100"/>
             </a:lvl8pPr>
-            <a:lvl9pPr marL="3657600" indent="0">
-              <a:buNone/>
-              <a:defRPr sz="900"/>
+            <a:lvl9pPr marL="4526280" indent="0">
+              <a:buNone/>
+              <a:defRPr sz="1100"/>
             </a:lvl9pPr>
           </a:lstStyle>
           <a:p>
@@ -2512,7 +2512,7 @@
           <a:p>
             <a:fld id="{A60EB551-423D-4362-9538-EAD90C18ABEF}" type="datetimeFigureOut">
               <a:rPr lang="fr-FR" smtClean="0"/>
-              <a:t>22/03/2017</a:t>
+              <a:t>24/03/2017</a:t>
             </a:fld>
             <a:endParaRPr lang="fr-FR"/>
           </a:p>
@@ -2607,15 +2607,15 @@
         </p:nvSpPr>
         <p:spPr>
           <a:xfrm>
-            <a:off x="352822" y="288370"/>
-            <a:ext cx="6350794" cy="1200150"/>
+            <a:off x="495065" y="288371"/>
+            <a:ext cx="8911114" cy="1200151"/>
           </a:xfrm>
           <a:prstGeom prst="rect">
             <a:avLst/>
           </a:prstGeom>
         </p:spPr>
         <p:txBody>
-          <a:bodyPr vert="horz" lIns="91440" tIns="45720" rIns="91440" bIns="45720" rtlCol="0" anchor="ctr">
+          <a:bodyPr vert="horz" lIns="113157" tIns="56579" rIns="113157" bIns="56579" rtlCol="0" anchor="ctr">
             <a:normAutofit/>
           </a:bodyPr>
           <a:lstStyle/>
@@ -2640,15 +2640,15 @@
         </p:nvSpPr>
         <p:spPr>
           <a:xfrm>
-            <a:off x="352822" y="1680212"/>
-            <a:ext cx="6350794" cy="4752261"/>
+            <a:off x="495065" y="1680212"/>
+            <a:ext cx="8911114" cy="4752261"/>
           </a:xfrm>
           <a:prstGeom prst="rect">
             <a:avLst/>
           </a:prstGeom>
         </p:spPr>
         <p:txBody>
-          <a:bodyPr vert="horz" lIns="91440" tIns="45720" rIns="91440" bIns="45720" rtlCol="0">
+          <a:bodyPr vert="horz" lIns="113157" tIns="56579" rIns="113157" bIns="56579" rtlCol="0">
             <a:normAutofit/>
           </a:bodyPr>
           <a:lstStyle/>
@@ -2702,18 +2702,18 @@
         </p:nvSpPr>
         <p:spPr>
           <a:xfrm>
-            <a:off x="352822" y="6674169"/>
-            <a:ext cx="1646502" cy="383381"/>
+            <a:off x="495068" y="6674172"/>
+            <a:ext cx="2310288" cy="383382"/>
           </a:xfrm>
           <a:prstGeom prst="rect">
             <a:avLst/>
           </a:prstGeom>
         </p:spPr>
         <p:txBody>
-          <a:bodyPr vert="horz" lIns="91440" tIns="45720" rIns="91440" bIns="45720" rtlCol="0" anchor="ctr"/>
+          <a:bodyPr vert="horz" lIns="113157" tIns="56579" rIns="113157" bIns="56579" rtlCol="0" anchor="ctr"/>
           <a:lstStyle>
             <a:lvl1pPr algn="l">
-              <a:defRPr sz="1200">
+              <a:defRPr sz="1500">
                 <a:solidFill>
                   <a:schemeClr val="tx1">
                     <a:tint val="75000"/>
@@ -2725,7 +2725,7 @@
           <a:p>
             <a:fld id="{A60EB551-423D-4362-9538-EAD90C18ABEF}" type="datetimeFigureOut">
               <a:rPr lang="fr-FR" smtClean="0"/>
-              <a:t>22/03/2017</a:t>
+              <a:t>24/03/2017</a:t>
             </a:fld>
             <a:endParaRPr lang="fr-FR"/>
           </a:p>
@@ -2743,18 +2743,18 @@
         </p:nvSpPr>
         <p:spPr>
           <a:xfrm>
-            <a:off x="2410950" y="6674169"/>
-            <a:ext cx="2234539" cy="383381"/>
+            <a:off x="3382924" y="6674172"/>
+            <a:ext cx="3135392" cy="383382"/>
           </a:xfrm>
           <a:prstGeom prst="rect">
             <a:avLst/>
           </a:prstGeom>
         </p:spPr>
         <p:txBody>
-          <a:bodyPr vert="horz" lIns="91440" tIns="45720" rIns="91440" bIns="45720" rtlCol="0" anchor="ctr"/>
+          <a:bodyPr vert="horz" lIns="113157" tIns="56579" rIns="113157" bIns="56579" rtlCol="0" anchor="ctr"/>
           <a:lstStyle>
             <a:lvl1pPr algn="ctr">
-              <a:defRPr sz="1200">
+              <a:defRPr sz="1500">
                 <a:solidFill>
                   <a:schemeClr val="tx1">
                     <a:tint val="75000"/>
@@ -2780,18 +2780,18 @@
         </p:nvSpPr>
         <p:spPr>
           <a:xfrm>
-            <a:off x="5057114" y="6674169"/>
-            <a:ext cx="1646502" cy="383381"/>
+            <a:off x="7095889" y="6674172"/>
+            <a:ext cx="2310288" cy="383382"/>
           </a:xfrm>
           <a:prstGeom prst="rect">
             <a:avLst/>
           </a:prstGeom>
         </p:spPr>
         <p:txBody>
-          <a:bodyPr vert="horz" lIns="91440" tIns="45720" rIns="91440" bIns="45720" rtlCol="0" anchor="ctr"/>
+          <a:bodyPr vert="horz" lIns="113157" tIns="56579" rIns="113157" bIns="56579" rtlCol="0" anchor="ctr"/>
           <a:lstStyle>
             <a:lvl1pPr algn="r">
-              <a:defRPr sz="1200">
+              <a:defRPr sz="1500">
                 <a:solidFill>
                   <a:schemeClr val="tx1">
                     <a:tint val="75000"/>
@@ -2832,12 +2832,12 @@
   </p:sldLayoutIdLst>
   <p:txStyles>
     <p:titleStyle>
-      <a:lvl1pPr algn="ctr" defTabSz="914400" rtl="0" eaLnBrk="1" latinLnBrk="0" hangingPunct="1">
+      <a:lvl1pPr algn="ctr" defTabSz="1131570" rtl="0" eaLnBrk="1" latinLnBrk="0" hangingPunct="1">
         <a:spcBef>
           <a:spcPct val="0"/>
         </a:spcBef>
         <a:buNone/>
-        <a:defRPr sz="4400" kern="1200">
+        <a:defRPr sz="5400" kern="1200">
           <a:solidFill>
             <a:schemeClr val="tx1"/>
           </a:solidFill>
@@ -2848,13 +2848,13 @@
       </a:lvl1pPr>
     </p:titleStyle>
     <p:bodyStyle>
-      <a:lvl1pPr marL="342900" indent="-342900" algn="l" defTabSz="914400" rtl="0" eaLnBrk="1" latinLnBrk="0" hangingPunct="1">
+      <a:lvl1pPr marL="424339" indent="-424339" algn="l" defTabSz="1131570" rtl="0" eaLnBrk="1" latinLnBrk="0" hangingPunct="1">
         <a:spcBef>
           <a:spcPct val="20000"/>
         </a:spcBef>
         <a:buFont typeface="Arial" pitchFamily="34" charset="0"/>
         <a:buChar char="•"/>
-        <a:defRPr sz="3200" kern="1200">
+        <a:defRPr sz="4000" kern="1200">
           <a:solidFill>
             <a:schemeClr val="tx1"/>
           </a:solidFill>
@@ -2863,13 +2863,13 @@
           <a:cs typeface="+mn-cs"/>
         </a:defRPr>
       </a:lvl1pPr>
-      <a:lvl2pPr marL="742950" indent="-285750" algn="l" defTabSz="914400" rtl="0" eaLnBrk="1" latinLnBrk="0" hangingPunct="1">
+      <a:lvl2pPr marL="919401" indent="-353616" algn="l" defTabSz="1131570" rtl="0" eaLnBrk="1" latinLnBrk="0" hangingPunct="1">
         <a:spcBef>
           <a:spcPct val="20000"/>
         </a:spcBef>
         <a:buFont typeface="Arial" pitchFamily="34" charset="0"/>
         <a:buChar char="–"/>
-        <a:defRPr sz="2800" kern="1200">
+        <a:defRPr sz="3500" kern="1200">
           <a:solidFill>
             <a:schemeClr val="tx1"/>
           </a:solidFill>
@@ -2878,13 +2878,13 @@
           <a:cs typeface="+mn-cs"/>
         </a:defRPr>
       </a:lvl2pPr>
-      <a:lvl3pPr marL="1143000" indent="-228600" algn="l" defTabSz="914400" rtl="0" eaLnBrk="1" latinLnBrk="0" hangingPunct="1">
+      <a:lvl3pPr marL="1414463" indent="-282893" algn="l" defTabSz="1131570" rtl="0" eaLnBrk="1" latinLnBrk="0" hangingPunct="1">
         <a:spcBef>
           <a:spcPct val="20000"/>
         </a:spcBef>
         <a:buFont typeface="Arial" pitchFamily="34" charset="0"/>
         <a:buChar char="•"/>
-        <a:defRPr sz="2400" kern="1200">
+        <a:defRPr sz="3000" kern="1200">
           <a:solidFill>
             <a:schemeClr val="tx1"/>
           </a:solidFill>
@@ -2893,13 +2893,13 @@
           <a:cs typeface="+mn-cs"/>
         </a:defRPr>
       </a:lvl3pPr>
-      <a:lvl4pPr marL="1600200" indent="-228600" algn="l" defTabSz="914400" rtl="0" eaLnBrk="1" latinLnBrk="0" hangingPunct="1">
+      <a:lvl4pPr marL="1980248" indent="-282893" algn="l" defTabSz="1131570" rtl="0" eaLnBrk="1" latinLnBrk="0" hangingPunct="1">
         <a:spcBef>
           <a:spcPct val="20000"/>
         </a:spcBef>
         <a:buFont typeface="Arial" pitchFamily="34" charset="0"/>
         <a:buChar char="–"/>
-        <a:defRPr sz="2000" kern="1200">
+        <a:defRPr sz="2500" kern="1200">
           <a:solidFill>
             <a:schemeClr val="tx1"/>
           </a:solidFill>
@@ -2908,13 +2908,13 @@
           <a:cs typeface="+mn-cs"/>
         </a:defRPr>
       </a:lvl4pPr>
-      <a:lvl5pPr marL="2057400" indent="-228600" algn="l" defTabSz="914400" rtl="0" eaLnBrk="1" latinLnBrk="0" hangingPunct="1">
+      <a:lvl5pPr marL="2546033" indent="-282893" algn="l" defTabSz="1131570" rtl="0" eaLnBrk="1" latinLnBrk="0" hangingPunct="1">
         <a:spcBef>
           <a:spcPct val="20000"/>
         </a:spcBef>
         <a:buFont typeface="Arial" pitchFamily="34" charset="0"/>
         <a:buChar char="»"/>
-        <a:defRPr sz="2000" kern="1200">
+        <a:defRPr sz="2500" kern="1200">
           <a:solidFill>
             <a:schemeClr val="tx1"/>
           </a:solidFill>
@@ -2923,13 +2923,13 @@
           <a:cs typeface="+mn-cs"/>
         </a:defRPr>
       </a:lvl5pPr>
-      <a:lvl6pPr marL="2514600" indent="-228600" algn="l" defTabSz="914400" rtl="0" eaLnBrk="1" latinLnBrk="0" hangingPunct="1">
+      <a:lvl6pPr marL="3111818" indent="-282893" algn="l" defTabSz="1131570" rtl="0" eaLnBrk="1" latinLnBrk="0" hangingPunct="1">
         <a:spcBef>
           <a:spcPct val="20000"/>
         </a:spcBef>
         <a:buFont typeface="Arial" pitchFamily="34" charset="0"/>
         <a:buChar char="•"/>
-        <a:defRPr sz="2000" kern="1200">
+        <a:defRPr sz="2500" kern="1200">
           <a:solidFill>
             <a:schemeClr val="tx1"/>
           </a:solidFill>
@@ -2938,13 +2938,13 @@
           <a:cs typeface="+mn-cs"/>
         </a:defRPr>
       </a:lvl6pPr>
-      <a:lvl7pPr marL="2971800" indent="-228600" algn="l" defTabSz="914400" rtl="0" eaLnBrk="1" latinLnBrk="0" hangingPunct="1">
+      <a:lvl7pPr marL="3677603" indent="-282893" algn="l" defTabSz="1131570" rtl="0" eaLnBrk="1" latinLnBrk="0" hangingPunct="1">
         <a:spcBef>
           <a:spcPct val="20000"/>
         </a:spcBef>
         <a:buFont typeface="Arial" pitchFamily="34" charset="0"/>
         <a:buChar char="•"/>
-        <a:defRPr sz="2000" kern="1200">
+        <a:defRPr sz="2500" kern="1200">
           <a:solidFill>
             <a:schemeClr val="tx1"/>
           </a:solidFill>
@@ -2953,13 +2953,13 @@
           <a:cs typeface="+mn-cs"/>
         </a:defRPr>
       </a:lvl7pPr>
-      <a:lvl8pPr marL="3429000" indent="-228600" algn="l" defTabSz="914400" rtl="0" eaLnBrk="1" latinLnBrk="0" hangingPunct="1">
+      <a:lvl8pPr marL="4243388" indent="-282893" algn="l" defTabSz="1131570" rtl="0" eaLnBrk="1" latinLnBrk="0" hangingPunct="1">
         <a:spcBef>
           <a:spcPct val="20000"/>
         </a:spcBef>
         <a:buFont typeface="Arial" pitchFamily="34" charset="0"/>
         <a:buChar char="•"/>
-        <a:defRPr sz="2000" kern="1200">
+        <a:defRPr sz="2500" kern="1200">
           <a:solidFill>
             <a:schemeClr val="tx1"/>
           </a:solidFill>
@@ -2968,13 +2968,13 @@
           <a:cs typeface="+mn-cs"/>
         </a:defRPr>
       </a:lvl8pPr>
-      <a:lvl9pPr marL="3886200" indent="-228600" algn="l" defTabSz="914400" rtl="0" eaLnBrk="1" latinLnBrk="0" hangingPunct="1">
+      <a:lvl9pPr marL="4809173" indent="-282893" algn="l" defTabSz="1131570" rtl="0" eaLnBrk="1" latinLnBrk="0" hangingPunct="1">
         <a:spcBef>
           <a:spcPct val="20000"/>
         </a:spcBef>
         <a:buFont typeface="Arial" pitchFamily="34" charset="0"/>
         <a:buChar char="•"/>
-        <a:defRPr sz="2000" kern="1200">
+        <a:defRPr sz="2500" kern="1200">
           <a:solidFill>
             <a:schemeClr val="tx1"/>
           </a:solidFill>
@@ -2988,8 +2988,8 @@
       <a:defPPr>
         <a:defRPr lang="fr-FR"/>
       </a:defPPr>
-      <a:lvl1pPr marL="0" algn="l" defTabSz="914400" rtl="0" eaLnBrk="1" latinLnBrk="0" hangingPunct="1">
-        <a:defRPr sz="1800" kern="1200">
+      <a:lvl1pPr marL="0" algn="l" defTabSz="1131570" rtl="0" eaLnBrk="1" latinLnBrk="0" hangingPunct="1">
+        <a:defRPr sz="2200" kern="1200">
           <a:solidFill>
             <a:schemeClr val="tx1"/>
           </a:solidFill>
@@ -2998,8 +2998,8 @@
           <a:cs typeface="+mn-cs"/>
         </a:defRPr>
       </a:lvl1pPr>
-      <a:lvl2pPr marL="457200" algn="l" defTabSz="914400" rtl="0" eaLnBrk="1" latinLnBrk="0" hangingPunct="1">
-        <a:defRPr sz="1800" kern="1200">
+      <a:lvl2pPr marL="565785" algn="l" defTabSz="1131570" rtl="0" eaLnBrk="1" latinLnBrk="0" hangingPunct="1">
+        <a:defRPr sz="2200" kern="1200">
           <a:solidFill>
             <a:schemeClr val="tx1"/>
           </a:solidFill>
@@ -3008,8 +3008,8 @@
           <a:cs typeface="+mn-cs"/>
         </a:defRPr>
       </a:lvl2pPr>
-      <a:lvl3pPr marL="914400" algn="l" defTabSz="914400" rtl="0" eaLnBrk="1" latinLnBrk="0" hangingPunct="1">
-        <a:defRPr sz="1800" kern="1200">
+      <a:lvl3pPr marL="1131570" algn="l" defTabSz="1131570" rtl="0" eaLnBrk="1" latinLnBrk="0" hangingPunct="1">
+        <a:defRPr sz="2200" kern="1200">
           <a:solidFill>
             <a:schemeClr val="tx1"/>
           </a:solidFill>
@@ -3018,8 +3018,8 @@
           <a:cs typeface="+mn-cs"/>
         </a:defRPr>
       </a:lvl3pPr>
-      <a:lvl4pPr marL="1371600" algn="l" defTabSz="914400" rtl="0" eaLnBrk="1" latinLnBrk="0" hangingPunct="1">
-        <a:defRPr sz="1800" kern="1200">
+      <a:lvl4pPr marL="1697355" algn="l" defTabSz="1131570" rtl="0" eaLnBrk="1" latinLnBrk="0" hangingPunct="1">
+        <a:defRPr sz="2200" kern="1200">
           <a:solidFill>
             <a:schemeClr val="tx1"/>
           </a:solidFill>
@@ -3028,8 +3028,8 @@
           <a:cs typeface="+mn-cs"/>
         </a:defRPr>
       </a:lvl4pPr>
-      <a:lvl5pPr marL="1828800" algn="l" defTabSz="914400" rtl="0" eaLnBrk="1" latinLnBrk="0" hangingPunct="1">
-        <a:defRPr sz="1800" kern="1200">
+      <a:lvl5pPr marL="2263140" algn="l" defTabSz="1131570" rtl="0" eaLnBrk="1" latinLnBrk="0" hangingPunct="1">
+        <a:defRPr sz="2200" kern="1200">
           <a:solidFill>
             <a:schemeClr val="tx1"/>
           </a:solidFill>
@@ -3038,8 +3038,8 @@
           <a:cs typeface="+mn-cs"/>
         </a:defRPr>
       </a:lvl5pPr>
-      <a:lvl6pPr marL="2286000" algn="l" defTabSz="914400" rtl="0" eaLnBrk="1" latinLnBrk="0" hangingPunct="1">
-        <a:defRPr sz="1800" kern="1200">
+      <a:lvl6pPr marL="2828925" algn="l" defTabSz="1131570" rtl="0" eaLnBrk="1" latinLnBrk="0" hangingPunct="1">
+        <a:defRPr sz="2200" kern="1200">
           <a:solidFill>
             <a:schemeClr val="tx1"/>
           </a:solidFill>
@@ -3048,8 +3048,8 @@
           <a:cs typeface="+mn-cs"/>
         </a:defRPr>
       </a:lvl6pPr>
-      <a:lvl7pPr marL="2743200" algn="l" defTabSz="914400" rtl="0" eaLnBrk="1" latinLnBrk="0" hangingPunct="1">
-        <a:defRPr sz="1800" kern="1200">
+      <a:lvl7pPr marL="3394710" algn="l" defTabSz="1131570" rtl="0" eaLnBrk="1" latinLnBrk="0" hangingPunct="1">
+        <a:defRPr sz="2200" kern="1200">
           <a:solidFill>
             <a:schemeClr val="tx1"/>
           </a:solidFill>
@@ -3058,8 +3058,8 @@
           <a:cs typeface="+mn-cs"/>
         </a:defRPr>
       </a:lvl7pPr>
-      <a:lvl8pPr marL="3200400" algn="l" defTabSz="914400" rtl="0" eaLnBrk="1" latinLnBrk="0" hangingPunct="1">
-        <a:defRPr sz="1800" kern="1200">
+      <a:lvl8pPr marL="3960495" algn="l" defTabSz="1131570" rtl="0" eaLnBrk="1" latinLnBrk="0" hangingPunct="1">
+        <a:defRPr sz="2200" kern="1200">
           <a:solidFill>
             <a:schemeClr val="tx1"/>
           </a:solidFill>
@@ -3068,8 +3068,8 @@
           <a:cs typeface="+mn-cs"/>
         </a:defRPr>
       </a:lvl8pPr>
-      <a:lvl9pPr marL="3657600" algn="l" defTabSz="914400" rtl="0" eaLnBrk="1" latinLnBrk="0" hangingPunct="1">
-        <a:defRPr sz="1800" kern="1200">
+      <a:lvl9pPr marL="4526280" algn="l" defTabSz="1131570" rtl="0" eaLnBrk="1" latinLnBrk="0" hangingPunct="1">
+        <a:defRPr sz="2200" kern="1200">
           <a:solidFill>
             <a:schemeClr val="tx1"/>
           </a:solidFill>
@@ -3102,7 +3102,7 @@
       </p:grpSpPr>
       <p:pic>
         <p:nvPicPr>
-          <p:cNvPr id="15" name="Picture 7"/>
+          <p:cNvPr id="1030" name="Picture 6"/>
           <p:cNvPicPr>
             <a:picLocks noChangeAspect="1" noChangeArrowheads="1"/>
           </p:cNvPicPr>
@@ -3123,7 +3123,71 @@
         </p:blipFill>
         <p:spPr bwMode="auto">
           <a:xfrm>
-            <a:off x="-173" y="0"/>
+            <a:off x="6836400" y="468482"/>
+            <a:ext cx="3063881" cy="3420000"/>
+          </a:xfrm>
+          <a:prstGeom prst="rect">
+            <a:avLst/>
+          </a:prstGeom>
+          <a:noFill/>
+          <a:ln>
+            <a:noFill/>
+          </a:ln>
+          <a:effectLst/>
+          <a:extLst>
+            <a:ext uri="{909E8E84-426E-40DD-AFC4-6F175D3DCCD1}">
+              <a14:hiddenFill xmlns:a14="http://schemas.microsoft.com/office/drawing/2010/main">
+                <a:solidFill>
+                  <a:schemeClr val="accent1"/>
+                </a:solidFill>
+              </a14:hiddenFill>
+            </a:ext>
+            <a:ext uri="{91240B29-F687-4F45-9708-019B960494DF}">
+              <a14:hiddenLine xmlns:a14="http://schemas.microsoft.com/office/drawing/2010/main" w="9525">
+                <a:solidFill>
+                  <a:schemeClr val="tx1"/>
+                </a:solidFill>
+                <a:miter lim="800000"/>
+                <a:headEnd/>
+                <a:tailEnd/>
+              </a14:hiddenLine>
+            </a:ext>
+            <a:ext uri="{AF507438-7753-43E0-B8FC-AC1667EBCBE1}">
+              <a14:hiddenEffects xmlns:a14="http://schemas.microsoft.com/office/drawing/2010/main">
+                <a:effectLst>
+                  <a:outerShdw dist="35921" dir="2700000" algn="ctr" rotWithShape="0">
+                    <a:schemeClr val="bg2"/>
+                  </a:outerShdw>
+                </a:effectLst>
+              </a14:hiddenEffects>
+            </a:ext>
+          </a:extLst>
+        </p:spPr>
+      </p:pic>
+      <p:pic>
+        <p:nvPicPr>
+          <p:cNvPr id="68" name="Picture 7"/>
+          <p:cNvPicPr>
+            <a:picLocks noChangeAspect="1" noChangeArrowheads="1"/>
+          </p:cNvPicPr>
+          <p:nvPr/>
+        </p:nvPicPr>
+        <p:blipFill>
+          <a:blip r:embed="rId3">
+            <a:extLst>
+              <a:ext uri="{28A0092B-C50C-407E-A947-70E740481C1C}">
+                <a14:useLocalDpi xmlns:a14="http://schemas.microsoft.com/office/drawing/2010/main" val="0"/>
+              </a:ext>
+            </a:extLst>
+          </a:blip>
+          <a:srcRect/>
+          <a:stretch>
+            <a:fillRect/>
+          </a:stretch>
+        </p:blipFill>
+        <p:spPr bwMode="auto">
+          <a:xfrm>
+            <a:off x="-173" y="623"/>
             <a:ext cx="4207650" cy="7200000"/>
           </a:xfrm>
           <a:prstGeom prst="rect">
@@ -3166,14 +3230,14 @@
       </p:pic>
       <p:pic>
         <p:nvPicPr>
-          <p:cNvPr id="16" name="Picture 8"/>
+          <p:cNvPr id="69" name="Picture 4"/>
           <p:cNvPicPr>
             <a:picLocks noChangeAspect="1" noChangeArrowheads="1"/>
           </p:cNvPicPr>
           <p:nvPr/>
         </p:nvPicPr>
         <p:blipFill>
-          <a:blip r:embed="rId3">
+          <a:blip r:embed="rId4">
             <a:extLst>
               <a:ext uri="{28A0092B-C50C-407E-A947-70E740481C1C}">
                 <a14:useLocalDpi xmlns:a14="http://schemas.microsoft.com/office/drawing/2010/main" val="0"/>
@@ -3187,8 +3251,8 @@
         </p:blipFill>
         <p:spPr bwMode="auto">
           <a:xfrm>
-            <a:off x="3960267" y="50"/>
-            <a:ext cx="3062404" cy="3420000"/>
+            <a:off x="3960000" y="3852858"/>
+            <a:ext cx="3068148" cy="3420000"/>
           </a:xfrm>
           <a:prstGeom prst="rect">
             <a:avLst/>
@@ -3230,14 +3294,14 @@
       </p:pic>
       <p:pic>
         <p:nvPicPr>
-          <p:cNvPr id="17" name="Picture 9"/>
+          <p:cNvPr id="70" name="Picture 3"/>
           <p:cNvPicPr>
             <a:picLocks noChangeAspect="1" noChangeArrowheads="1"/>
           </p:cNvPicPr>
           <p:nvPr/>
         </p:nvPicPr>
         <p:blipFill>
-          <a:blip r:embed="rId4">
+          <a:blip r:embed="rId5">
             <a:extLst>
               <a:ext uri="{28A0092B-C50C-407E-A947-70E740481C1C}">
                 <a14:useLocalDpi xmlns:a14="http://schemas.microsoft.com/office/drawing/2010/main" val="0"/>
@@ -3251,8 +3315,8 @@
         </p:blipFill>
         <p:spPr bwMode="auto">
           <a:xfrm>
-            <a:off x="3960267" y="3816474"/>
-            <a:ext cx="3068148" cy="3420000"/>
+            <a:off x="3960000" y="468482"/>
+            <a:ext cx="3062404" cy="3420000"/>
           </a:xfrm>
           <a:prstGeom prst="rect">
             <a:avLst/>
@@ -3294,13 +3358,13 @@
       </p:pic>
       <p:sp>
         <p:nvSpPr>
-          <p:cNvPr id="4" name="ZoneTexte 3"/>
+          <p:cNvPr id="71" name="ZoneTexte 70"/>
           <p:cNvSpPr txBox="1"/>
           <p:nvPr/>
         </p:nvSpPr>
         <p:spPr>
           <a:xfrm>
-            <a:off x="941132" y="216074"/>
+            <a:off x="941132" y="216697"/>
             <a:ext cx="498855" cy="430887"/>
           </a:xfrm>
           <a:prstGeom prst="rect">
@@ -3336,13 +3400,13 @@
       </p:sp>
       <p:sp>
         <p:nvSpPr>
-          <p:cNvPr id="19" name="ZoneTexte 18"/>
+          <p:cNvPr id="72" name="ZoneTexte 71"/>
           <p:cNvSpPr txBox="1"/>
           <p:nvPr/>
         </p:nvSpPr>
         <p:spPr>
           <a:xfrm>
-            <a:off x="4613540" y="216074"/>
+            <a:off x="4572893" y="685129"/>
             <a:ext cx="514885" cy="430887"/>
           </a:xfrm>
           <a:prstGeom prst="rect">
@@ -3372,13 +3436,13 @@
       </p:sp>
       <p:sp>
         <p:nvSpPr>
-          <p:cNvPr id="20" name="ZoneTexte 19"/>
+          <p:cNvPr id="73" name="ZoneTexte 72"/>
           <p:cNvSpPr txBox="1"/>
           <p:nvPr/>
         </p:nvSpPr>
         <p:spPr>
           <a:xfrm>
-            <a:off x="4608339" y="4032498"/>
+            <a:off x="4608339" y="4069929"/>
             <a:ext cx="498855" cy="430887"/>
           </a:xfrm>
           <a:prstGeom prst="rect">
@@ -3398,6 +3462,125 @@
                 <a:cs typeface="Times New Roman" pitchFamily="18" charset="0"/>
               </a:rPr>
               <a:t>(c)</a:t>
+            </a:r>
+            <a:endParaRPr lang="fr-FR" sz="2200" dirty="0">
+              <a:latin typeface="Times New Roman" pitchFamily="18" charset="0"/>
+              <a:cs typeface="Times New Roman" pitchFamily="18" charset="0"/>
+            </a:endParaRPr>
+          </a:p>
+        </p:txBody>
+      </p:sp>
+      <p:cxnSp>
+        <p:nvCxnSpPr>
+          <p:cNvPr id="6" name="Connecteur droit avec flèche 5"/>
+          <p:cNvCxnSpPr/>
+          <p:nvPr/>
+        </p:nvCxnSpPr>
+        <p:spPr>
+          <a:xfrm>
+            <a:off x="4608339" y="504106"/>
+            <a:ext cx="4374728" cy="0"/>
+          </a:xfrm>
+          <a:prstGeom prst="straightConnector1">
+            <a:avLst/>
+          </a:prstGeom>
+          <a:ln>
+            <a:tailEnd type="arrow" w="lg" len="med"/>
+          </a:ln>
+        </p:spPr>
+        <p:style>
+          <a:lnRef idx="1">
+            <a:schemeClr val="accent1"/>
+          </a:lnRef>
+          <a:fillRef idx="0">
+            <a:schemeClr val="accent1"/>
+          </a:fillRef>
+          <a:effectRef idx="0">
+            <a:schemeClr val="accent1"/>
+          </a:effectRef>
+          <a:fontRef idx="minor">
+            <a:schemeClr val="tx1"/>
+          </a:fontRef>
+        </p:style>
+      </p:cxnSp>
+      <p:sp>
+        <p:nvSpPr>
+          <p:cNvPr id="76" name="ZoneTexte 75"/>
+          <p:cNvSpPr txBox="1"/>
+          <p:nvPr/>
+        </p:nvSpPr>
+        <p:spPr>
+          <a:xfrm>
+            <a:off x="5454675" y="42441"/>
+            <a:ext cx="2702984" cy="461665"/>
+          </a:xfrm>
+          <a:prstGeom prst="rect">
+            <a:avLst/>
+          </a:prstGeom>
+          <a:noFill/>
+        </p:spPr>
+        <p:txBody>
+          <a:bodyPr wrap="none" rtlCol="0">
+            <a:spAutoFit/>
+          </a:bodyPr>
+          <a:lstStyle/>
+          <a:p>
+            <a:r>
+              <a:rPr lang="fr-FR" sz="2400" dirty="0" err="1" smtClean="0">
+                <a:latin typeface="Times New Roman" pitchFamily="18" charset="0"/>
+                <a:cs typeface="Times New Roman" pitchFamily="18" charset="0"/>
+              </a:rPr>
+              <a:t>Symmetry</a:t>
+            </a:r>
+            <a:r>
+              <a:rPr lang="fr-FR" sz="2400" dirty="0" smtClean="0">
+                <a:latin typeface="Times New Roman" pitchFamily="18" charset="0"/>
+                <a:cs typeface="Times New Roman" pitchFamily="18" charset="0"/>
+              </a:rPr>
+              <a:t> </a:t>
+            </a:r>
+            <a:r>
+              <a:rPr lang="fr-FR" sz="2400" dirty="0" err="1" smtClean="0">
+                <a:latin typeface="Times New Roman" pitchFamily="18" charset="0"/>
+                <a:cs typeface="Times New Roman" pitchFamily="18" charset="0"/>
+              </a:rPr>
+              <a:t>reduction</a:t>
+            </a:r>
+            <a:endParaRPr lang="fr-FR" sz="2400" dirty="0">
+              <a:latin typeface="Times New Roman" pitchFamily="18" charset="0"/>
+              <a:cs typeface="Times New Roman" pitchFamily="18" charset="0"/>
+            </a:endParaRPr>
+          </a:p>
+        </p:txBody>
+      </p:sp>
+      <p:sp>
+        <p:nvSpPr>
+          <p:cNvPr id="81" name="ZoneTexte 80"/>
+          <p:cNvSpPr txBox="1"/>
+          <p:nvPr/>
+        </p:nvSpPr>
+        <p:spPr>
+          <a:xfrm>
+            <a:off x="7460070" y="684000"/>
+            <a:ext cx="514885" cy="430887"/>
+          </a:xfrm>
+          <a:prstGeom prst="rect">
+            <a:avLst/>
+          </a:prstGeom>
+          <a:noFill/>
+        </p:spPr>
+        <p:txBody>
+          <a:bodyPr wrap="none" rtlCol="0">
+            <a:spAutoFit/>
+          </a:bodyPr>
+          <a:lstStyle/>
+          <a:p>
+            <a:r>
+              <a:rPr lang="fr-FR" sz="2200" dirty="0" smtClean="0">
+                <a:latin typeface="Times New Roman" pitchFamily="18" charset="0"/>
+                <a:cs typeface="Times New Roman" pitchFamily="18" charset="0"/>
+              </a:rPr>
+              <a:t>(d)</a:t>
             </a:r>
             <a:endParaRPr lang="fr-FR" sz="2200" dirty="0">
               <a:latin typeface="Times New Roman" pitchFamily="18" charset="0"/>

</xml_diff>